<commit_message>
code for calibration and changes in clinical paper draft
</commit_message>
<xml_diff>
--- a/src/clinical_gap3/shinyapp/explanation-images.pptx
+++ b/src/clinical_gap3/shinyapp/explanation-images.pptx
@@ -906,12 +906,8 @@
         <a:lstStyle/>
         <a:p>
           <a:r>
-            <a:rPr lang="nl-NL" sz="2400" dirty="0" smtClean="0"/>
-            <a:t>Time of </a:t>
-          </a:r>
-          <a:r>
             <a:rPr lang="nl-NL" sz="2400" dirty="0" err="1" smtClean="0"/>
-            <a:t>latest</a:t>
+            <a:t>Previous</a:t>
           </a:r>
           <a:r>
             <a:rPr lang="nl-NL" sz="2400" dirty="0" smtClean="0"/>
@@ -920,6 +916,14 @@
           <a:r>
             <a:rPr lang="nl-NL" sz="2400" dirty="0" err="1" smtClean="0"/>
             <a:t>biopsy</a:t>
+          </a:r>
+          <a:r>
+            <a:rPr lang="nl-NL" sz="2400" dirty="0" smtClean="0"/>
+            <a:t> </a:t>
+          </a:r>
+          <a:r>
+            <a:rPr lang="nl-NL" sz="2400" dirty="0" err="1" smtClean="0"/>
+            <a:t>results</a:t>
           </a:r>
           <a:endParaRPr lang="en-US" sz="2400" dirty="0"/>
         </a:p>
@@ -1045,6 +1049,13 @@
         </dgm:presLayoutVars>
       </dgm:prSet>
       <dgm:spPr/>
+      <dgm:t>
+        <a:bodyPr/>
+        <a:lstStyle/>
+        <a:p>
+          <a:endParaRPr lang="en-US"/>
+        </a:p>
+      </dgm:t>
     </dgm:pt>
     <dgm:pt modelId="{69779C89-CE76-4AA8-9F05-7C04257D608B}" type="pres">
       <dgm:prSet presAssocID="{133B86D8-D91D-4F49-891A-9C2605EE514A}" presName="spacerT" presStyleCnt="0"/>
@@ -1053,6 +1064,13 @@
     <dgm:pt modelId="{BAA37768-E657-467A-BCD6-096800607687}" type="pres">
       <dgm:prSet presAssocID="{133B86D8-D91D-4F49-891A-9C2605EE514A}" presName="sibTrans" presStyleLbl="sibTrans2D1" presStyleIdx="0" presStyleCnt="3"/>
       <dgm:spPr/>
+      <dgm:t>
+        <a:bodyPr/>
+        <a:lstStyle/>
+        <a:p>
+          <a:endParaRPr lang="en-US"/>
+        </a:p>
+      </dgm:t>
     </dgm:pt>
     <dgm:pt modelId="{712FF570-8CFD-4610-BC32-7B3D961B327E}" type="pres">
       <dgm:prSet presAssocID="{133B86D8-D91D-4F49-891A-9C2605EE514A}" presName="spacerB" presStyleCnt="0"/>
@@ -1080,6 +1098,13 @@
     <dgm:pt modelId="{AF22D1FB-04E7-4D36-B7FE-62F18D78607A}" type="pres">
       <dgm:prSet presAssocID="{98DAD940-D4BF-42CB-A5D9-440F2C48CF63}" presName="sibTrans" presStyleLbl="sibTrans2D1" presStyleIdx="1" presStyleCnt="3"/>
       <dgm:spPr/>
+      <dgm:t>
+        <a:bodyPr/>
+        <a:lstStyle/>
+        <a:p>
+          <a:endParaRPr lang="en-US"/>
+        </a:p>
+      </dgm:t>
     </dgm:pt>
     <dgm:pt modelId="{25BFE17C-2A4D-49C0-909C-075248557D13}" type="pres">
       <dgm:prSet presAssocID="{98DAD940-D4BF-42CB-A5D9-440F2C48CF63}" presName="spacerB" presStyleCnt="0"/>
@@ -1092,14 +1117,35 @@
         </dgm:presLayoutVars>
       </dgm:prSet>
       <dgm:spPr/>
+      <dgm:t>
+        <a:bodyPr/>
+        <a:lstStyle/>
+        <a:p>
+          <a:endParaRPr lang="en-US"/>
+        </a:p>
+      </dgm:t>
     </dgm:pt>
     <dgm:pt modelId="{04E5B552-CEED-4930-B592-D144C2F70B33}" type="pres">
       <dgm:prSet presAssocID="{F348FF41-F6A0-44CB-8A74-5BC900F0B59C}" presName="sibTransLast" presStyleLbl="sibTrans2D1" presStyleIdx="2" presStyleCnt="3"/>
       <dgm:spPr/>
+      <dgm:t>
+        <a:bodyPr/>
+        <a:lstStyle/>
+        <a:p>
+          <a:endParaRPr lang="en-US"/>
+        </a:p>
+      </dgm:t>
     </dgm:pt>
     <dgm:pt modelId="{56843602-6DE4-453E-A3C4-58F466516D2A}" type="pres">
       <dgm:prSet presAssocID="{F348FF41-F6A0-44CB-8A74-5BC900F0B59C}" presName="connectorText" presStyleLbl="sibTrans2D1" presStyleIdx="2" presStyleCnt="3"/>
       <dgm:spPr/>
+      <dgm:t>
+        <a:bodyPr/>
+        <a:lstStyle/>
+        <a:p>
+          <a:endParaRPr lang="en-US"/>
+        </a:p>
+      </dgm:t>
     </dgm:pt>
     <dgm:pt modelId="{79C300FE-59D3-417D-B337-E82E52C2F39F}" type="pres">
       <dgm:prSet presAssocID="{F348FF41-F6A0-44CB-8A74-5BC900F0B59C}" presName="lastNode" presStyleLbl="node1" presStyleIdx="3" presStyleCnt="4">
@@ -1372,12 +1418,8 @@
             </a:spcAft>
           </a:pPr>
           <a:r>
-            <a:rPr lang="nl-NL" sz="2400" kern="1200" dirty="0" smtClean="0"/>
-            <a:t>Time of </a:t>
-          </a:r>
-          <a:r>
             <a:rPr lang="nl-NL" sz="2400" kern="1200" dirty="0" err="1" smtClean="0"/>
-            <a:t>latest</a:t>
+            <a:t>Previous</a:t>
           </a:r>
           <a:r>
             <a:rPr lang="nl-NL" sz="2400" kern="1200" dirty="0" smtClean="0"/>
@@ -1386,6 +1428,14 @@
           <a:r>
             <a:rPr lang="nl-NL" sz="2400" kern="1200" dirty="0" err="1" smtClean="0"/>
             <a:t>biopsy</a:t>
+          </a:r>
+          <a:r>
+            <a:rPr lang="nl-NL" sz="2400" kern="1200" dirty="0" smtClean="0"/>
+            <a:t> </a:t>
+          </a:r>
+          <a:r>
+            <a:rPr lang="nl-NL" sz="2400" kern="1200" dirty="0" err="1" smtClean="0"/>
+            <a:t>results</a:t>
           </a:r>
           <a:endParaRPr lang="en-US" sz="2400" kern="1200" dirty="0"/>
         </a:p>
@@ -3172,7 +3222,7 @@
           <a:p>
             <a:fld id="{5EB75B4F-E93D-4446-BD96-3EE2BA4BF000}" type="datetimeFigureOut">
               <a:rPr lang="en-US" smtClean="0"/>
-              <a:t>6/26/2019</a:t>
+              <a:t>9/10/2019</a:t>
             </a:fld>
             <a:endParaRPr lang="en-US"/>
           </a:p>
@@ -3342,7 +3392,7 @@
           <a:p>
             <a:fld id="{5EB75B4F-E93D-4446-BD96-3EE2BA4BF000}" type="datetimeFigureOut">
               <a:rPr lang="en-US" smtClean="0"/>
-              <a:t>6/26/2019</a:t>
+              <a:t>9/10/2019</a:t>
             </a:fld>
             <a:endParaRPr lang="en-US"/>
           </a:p>
@@ -3522,7 +3572,7 @@
           <a:p>
             <a:fld id="{5EB75B4F-E93D-4446-BD96-3EE2BA4BF000}" type="datetimeFigureOut">
               <a:rPr lang="en-US" smtClean="0"/>
-              <a:t>6/26/2019</a:t>
+              <a:t>9/10/2019</a:t>
             </a:fld>
             <a:endParaRPr lang="en-US"/>
           </a:p>
@@ -3692,7 +3742,7 @@
           <a:p>
             <a:fld id="{5EB75B4F-E93D-4446-BD96-3EE2BA4BF000}" type="datetimeFigureOut">
               <a:rPr lang="en-US" smtClean="0"/>
-              <a:t>6/26/2019</a:t>
+              <a:t>9/10/2019</a:t>
             </a:fld>
             <a:endParaRPr lang="en-US"/>
           </a:p>
@@ -3938,7 +3988,7 @@
           <a:p>
             <a:fld id="{5EB75B4F-E93D-4446-BD96-3EE2BA4BF000}" type="datetimeFigureOut">
               <a:rPr lang="en-US" smtClean="0"/>
-              <a:t>6/26/2019</a:t>
+              <a:t>9/10/2019</a:t>
             </a:fld>
             <a:endParaRPr lang="en-US"/>
           </a:p>
@@ -4226,7 +4276,7 @@
           <a:p>
             <a:fld id="{5EB75B4F-E93D-4446-BD96-3EE2BA4BF000}" type="datetimeFigureOut">
               <a:rPr lang="en-US" smtClean="0"/>
-              <a:t>6/26/2019</a:t>
+              <a:t>9/10/2019</a:t>
             </a:fld>
             <a:endParaRPr lang="en-US"/>
           </a:p>
@@ -4648,7 +4698,7 @@
           <a:p>
             <a:fld id="{5EB75B4F-E93D-4446-BD96-3EE2BA4BF000}" type="datetimeFigureOut">
               <a:rPr lang="en-US" smtClean="0"/>
-              <a:t>6/26/2019</a:t>
+              <a:t>9/10/2019</a:t>
             </a:fld>
             <a:endParaRPr lang="en-US"/>
           </a:p>
@@ -4766,7 +4816,7 @@
           <a:p>
             <a:fld id="{5EB75B4F-E93D-4446-BD96-3EE2BA4BF000}" type="datetimeFigureOut">
               <a:rPr lang="en-US" smtClean="0"/>
-              <a:t>6/26/2019</a:t>
+              <a:t>9/10/2019</a:t>
             </a:fld>
             <a:endParaRPr lang="en-US"/>
           </a:p>
@@ -4861,7 +4911,7 @@
           <a:p>
             <a:fld id="{5EB75B4F-E93D-4446-BD96-3EE2BA4BF000}" type="datetimeFigureOut">
               <a:rPr lang="en-US" smtClean="0"/>
-              <a:t>6/26/2019</a:t>
+              <a:t>9/10/2019</a:t>
             </a:fld>
             <a:endParaRPr lang="en-US"/>
           </a:p>
@@ -5138,7 +5188,7 @@
           <a:p>
             <a:fld id="{5EB75B4F-E93D-4446-BD96-3EE2BA4BF000}" type="datetimeFigureOut">
               <a:rPr lang="en-US" smtClean="0"/>
-              <a:t>6/26/2019</a:t>
+              <a:t>9/10/2019</a:t>
             </a:fld>
             <a:endParaRPr lang="en-US"/>
           </a:p>
@@ -5391,7 +5441,7 @@
           <a:p>
             <a:fld id="{5EB75B4F-E93D-4446-BD96-3EE2BA4BF000}" type="datetimeFigureOut">
               <a:rPr lang="en-US" smtClean="0"/>
-              <a:t>6/26/2019</a:t>
+              <a:t>9/10/2019</a:t>
             </a:fld>
             <a:endParaRPr lang="en-US"/>
           </a:p>
@@ -5604,7 +5654,7 @@
           <a:p>
             <a:fld id="{5EB75B4F-E93D-4446-BD96-3EE2BA4BF000}" type="datetimeFigureOut">
               <a:rPr lang="en-US" smtClean="0"/>
-              <a:t>6/26/2019</a:t>
+              <a:t>9/10/2019</a:t>
             </a:fld>
             <a:endParaRPr lang="en-US"/>
           </a:p>
@@ -5989,7 +6039,7 @@
             <p:ph idx="1"/>
             <p:extLst>
               <p:ext uri="{D42A27DB-BD31-4B8C-83A1-F6EECF244321}">
-                <p14:modId xmlns:p14="http://schemas.microsoft.com/office/powerpoint/2010/main" val="3569329536"/>
+                <p14:modId xmlns:p14="http://schemas.microsoft.com/office/powerpoint/2010/main" val="3686516870"/>
               </p:ext>
             </p:extLst>
           </p:nvPr>
@@ -6120,16 +6170,169 @@
           </p:txBody>
         </p:sp>
       </p:grpSp>
+      <mc:AlternateContent xmlns:mc="http://schemas.openxmlformats.org/markup-compatibility/2006">
+        <mc:Choice xmlns:a14="http://schemas.microsoft.com/office/drawing/2010/main" Requires="a14">
+          <p:sp>
+            <p:nvSpPr>
+              <p:cNvPr id="9" name="TextBox 8"/>
+              <p:cNvSpPr txBox="1"/>
+              <p:nvPr/>
+            </p:nvSpPr>
+            <p:spPr>
+              <a:xfrm>
+                <a:off x="5729101" y="3781100"/>
+                <a:ext cx="2952328" cy="1200329"/>
+              </a:xfrm>
+              <a:prstGeom prst="rect">
+                <a:avLst/>
+              </a:prstGeom>
+              <a:noFill/>
+            </p:spPr>
+            <p:txBody>
+              <a:bodyPr wrap="square" rtlCol="0">
+                <a:spAutoFit/>
+              </a:bodyPr>
+              <a:lstStyle/>
+              <a:p>
+                <a:pPr algn="ctr"/>
+                <a:r>
+                  <a:rPr lang="nl-NL" sz="2400" dirty="0" smtClean="0">
+                    <a:solidFill>
+                      <a:srgbClr val="FF0000"/>
+                    </a:solidFill>
+                  </a:rPr>
+                  <a:t>Personalized</a:t>
+                </a:r>
+                <a:r>
+                  <a:rPr lang="nl-NL" sz="2400" dirty="0" smtClean="0">
+                    <a:solidFill>
+                      <a:srgbClr val="FF0000"/>
+                    </a:solidFill>
+                  </a:rPr>
+                  <a:t> </a:t>
+                </a:r>
+                <a:r>
+                  <a:rPr lang="nl-NL" sz="2400" dirty="0" err="1" smtClean="0">
+                    <a:solidFill>
+                      <a:srgbClr val="FF0000"/>
+                    </a:solidFill>
+                  </a:rPr>
+                  <a:t>Cumulative</a:t>
+                </a:r>
+                <a:r>
+                  <a:rPr lang="nl-NL" sz="2400" dirty="0" smtClean="0">
+                    <a:solidFill>
+                      <a:srgbClr val="FF0000"/>
+                    </a:solidFill>
+                  </a:rPr>
+                  <a:t>-risk of </a:t>
+                </a:r>
+              </a:p>
+              <a:p>
+                <a:pPr algn="ctr"/>
+                <a:r>
+                  <a:rPr lang="nl-NL" sz="2400" dirty="0" err="1" smtClean="0">
+                    <a:solidFill>
+                      <a:srgbClr val="FF0000"/>
+                    </a:solidFill>
+                  </a:rPr>
+                  <a:t>Gleason</a:t>
+                </a:r>
+                <a:r>
+                  <a:rPr lang="nl-NL" sz="2400" dirty="0" smtClean="0">
+                    <a:solidFill>
+                      <a:srgbClr val="FF0000"/>
+                    </a:solidFill>
+                  </a:rPr>
+                  <a:t> </a:t>
+                </a:r>
+                <a:r>
+                  <a:rPr lang="nl-NL" sz="2400" dirty="0" smtClean="0">
+                    <a:solidFill>
+                      <a:srgbClr val="FF0000"/>
+                    </a:solidFill>
+                  </a:rPr>
+                  <a:t>grade </a:t>
+                </a:r>
+                <a14:m>
+                  <m:oMath xmlns:m="http://schemas.openxmlformats.org/officeDocument/2006/math">
+                    <m:r>
+                      <a:rPr lang="nl-NL" sz="2400" b="0" i="1" smtClean="0">
+                        <a:solidFill>
+                          <a:srgbClr val="FF0000"/>
+                        </a:solidFill>
+                        <a:latin typeface="Cambria Math"/>
+                      </a:rPr>
+                      <m:t>≥</m:t>
+                    </m:r>
+                  </m:oMath>
+                </a14:m>
+                <a:r>
+                  <a:rPr lang="en-US" sz="2400" dirty="0" smtClean="0">
+                    <a:solidFill>
+                      <a:srgbClr val="FF0000"/>
+                    </a:solidFill>
+                  </a:rPr>
+                  <a:t> 2</a:t>
+                </a:r>
+                <a:endParaRPr lang="en-US" sz="2400" dirty="0">
+                  <a:solidFill>
+                    <a:srgbClr val="FF0000"/>
+                  </a:solidFill>
+                </a:endParaRPr>
+              </a:p>
+            </p:txBody>
+          </p:sp>
+        </mc:Choice>
+        <mc:Fallback>
+          <p:sp>
+            <p:nvSpPr>
+              <p:cNvPr id="9" name="TextBox 8"/>
+              <p:cNvSpPr txBox="1">
+                <a:spLocks noRot="1" noChangeAspect="1" noMove="1" noResize="1" noEditPoints="1" noAdjustHandles="1" noChangeArrowheads="1" noChangeShapeType="1" noTextEdit="1"/>
+              </p:cNvSpPr>
+              <p:nvPr/>
+            </p:nvSpPr>
+            <p:spPr>
+              <a:xfrm>
+                <a:off x="5729101" y="3781100"/>
+                <a:ext cx="2952328" cy="1200329"/>
+              </a:xfrm>
+              <a:prstGeom prst="rect">
+                <a:avLst/>
+              </a:prstGeom>
+              <a:blipFill rotWithShape="1">
+                <a:blip r:embed="rId7"/>
+                <a:stretch>
+                  <a:fillRect t="-4061" b="-10660"/>
+                </a:stretch>
+              </a:blipFill>
+            </p:spPr>
+            <p:txBody>
+              <a:bodyPr/>
+              <a:lstStyle/>
+              <a:p>
+                <a:r>
+                  <a:rPr lang="en-US">
+                    <a:noFill/>
+                  </a:rPr>
+                  <a:t> </a:t>
+                </a:r>
+              </a:p>
+            </p:txBody>
+          </p:sp>
+        </mc:Fallback>
+      </mc:AlternateContent>
       <p:pic>
         <p:nvPicPr>
-          <p:cNvPr id="1028" name="Picture 4"/>
+          <p:cNvPr id="1027" name="Picture 3"/>
           <p:cNvPicPr>
             <a:picLocks noChangeAspect="1" noChangeArrowheads="1"/>
           </p:cNvPicPr>
           <p:nvPr/>
         </p:nvPicPr>
         <p:blipFill>
-          <a:blip r:embed="rId7">
+          <a:blip r:embed="rId8">
             <a:extLst>
               <a:ext uri="{28A0092B-C50C-407E-A947-70E740481C1C}">
                 <a14:useLocalDpi xmlns:a14="http://schemas.microsoft.com/office/drawing/2010/main" val="0"/>
@@ -6143,8 +6346,8 @@
         </p:blipFill>
         <p:spPr bwMode="auto">
           <a:xfrm>
-            <a:off x="5524456" y="2216302"/>
-            <a:ext cx="3574177" cy="1883688"/>
+            <a:off x="5724128" y="2247575"/>
+            <a:ext cx="2962275" cy="1533525"/>
           </a:xfrm>
           <a:prstGeom prst="rect">
             <a:avLst/>
@@ -6174,169 +6377,6 @@
           </a:extLst>
         </p:spPr>
       </p:pic>
-      <mc:AlternateContent xmlns:mc="http://schemas.openxmlformats.org/markup-compatibility/2006">
-        <mc:Choice xmlns:a14="http://schemas.microsoft.com/office/drawing/2010/main" Requires="a14">
-          <p:sp>
-            <p:nvSpPr>
-              <p:cNvPr id="9" name="TextBox 8"/>
-              <p:cNvSpPr txBox="1"/>
-              <p:nvPr/>
-            </p:nvSpPr>
-            <p:spPr>
-              <a:xfrm>
-                <a:off x="5835380" y="4099990"/>
-                <a:ext cx="2952328" cy="1200329"/>
-              </a:xfrm>
-              <a:prstGeom prst="rect">
-                <a:avLst/>
-              </a:prstGeom>
-              <a:noFill/>
-            </p:spPr>
-            <p:txBody>
-              <a:bodyPr wrap="square" rtlCol="0">
-                <a:spAutoFit/>
-              </a:bodyPr>
-              <a:lstStyle/>
-              <a:p>
-                <a:pPr algn="ctr"/>
-                <a:r>
-                  <a:rPr lang="nl-NL" sz="2400" dirty="0" err="1" smtClean="0">
-                    <a:solidFill>
-                      <a:schemeClr val="accent3">
-                        <a:lumMod val="75000"/>
-                      </a:schemeClr>
-                    </a:solidFill>
-                  </a:rPr>
-                  <a:t>Personalized</a:t>
-                </a:r>
-                <a:r>
-                  <a:rPr lang="nl-NL" sz="2400" dirty="0" smtClean="0">
-                    <a:solidFill>
-                      <a:schemeClr val="accent3">
-                        <a:lumMod val="75000"/>
-                      </a:schemeClr>
-                    </a:solidFill>
-                  </a:rPr>
-                  <a:t> </a:t>
-                </a:r>
-                <a:r>
-                  <a:rPr lang="nl-NL" sz="2400" dirty="0" err="1" smtClean="0">
-                    <a:solidFill>
-                      <a:schemeClr val="accent3">
-                        <a:lumMod val="75000"/>
-                      </a:schemeClr>
-                    </a:solidFill>
-                  </a:rPr>
-                  <a:t>Cumulative</a:t>
-                </a:r>
-                <a:r>
-                  <a:rPr lang="nl-NL" sz="2400" dirty="0" smtClean="0">
-                    <a:solidFill>
-                      <a:schemeClr val="accent3">
-                        <a:lumMod val="75000"/>
-                      </a:schemeClr>
-                    </a:solidFill>
-                  </a:rPr>
-                  <a:t>-risk of </a:t>
-                </a:r>
-              </a:p>
-              <a:p>
-                <a:pPr algn="ctr"/>
-                <a:r>
-                  <a:rPr lang="nl-NL" sz="2400" dirty="0" err="1" smtClean="0">
-                    <a:solidFill>
-                      <a:schemeClr val="accent3">
-                        <a:lumMod val="75000"/>
-                      </a:schemeClr>
-                    </a:solidFill>
-                  </a:rPr>
-                  <a:t>Gleason</a:t>
-                </a:r>
-                <a:r>
-                  <a:rPr lang="nl-NL" sz="2400" dirty="0" smtClean="0">
-                    <a:solidFill>
-                      <a:schemeClr val="accent3">
-                        <a:lumMod val="75000"/>
-                      </a:schemeClr>
-                    </a:solidFill>
-                  </a:rPr>
-                  <a:t> </a:t>
-                </a:r>
-                <a14:m>
-                  <m:oMath xmlns:m="http://schemas.openxmlformats.org/officeDocument/2006/math">
-                    <m:r>
-                      <a:rPr lang="nl-NL" sz="2400" b="0" i="1" smtClean="0">
-                        <a:solidFill>
-                          <a:schemeClr val="accent3">
-                            <a:lumMod val="75000"/>
-                          </a:schemeClr>
-                        </a:solidFill>
-                        <a:latin typeface="Cambria Math"/>
-                      </a:rPr>
-                      <m:t>≥</m:t>
-                    </m:r>
-                  </m:oMath>
-                </a14:m>
-                <a:r>
-                  <a:rPr lang="en-US" sz="2400" dirty="0" smtClean="0">
-                    <a:solidFill>
-                      <a:schemeClr val="accent3">
-                        <a:lumMod val="75000"/>
-                      </a:schemeClr>
-                    </a:solidFill>
-                  </a:rPr>
-                  <a:t> 7</a:t>
-                </a:r>
-                <a:endParaRPr lang="en-US" sz="2400" dirty="0">
-                  <a:solidFill>
-                    <a:schemeClr val="accent3">
-                      <a:lumMod val="75000"/>
-                    </a:schemeClr>
-                  </a:solidFill>
-                </a:endParaRPr>
-              </a:p>
-            </p:txBody>
-          </p:sp>
-        </mc:Choice>
-        <mc:Fallback>
-          <p:sp>
-            <p:nvSpPr>
-              <p:cNvPr id="9" name="TextBox 8"/>
-              <p:cNvSpPr txBox="1">
-                <a:spLocks noRot="1" noChangeAspect="1" noMove="1" noResize="1" noEditPoints="1" noAdjustHandles="1" noChangeArrowheads="1" noChangeShapeType="1" noTextEdit="1"/>
-              </p:cNvSpPr>
-              <p:nvPr/>
-            </p:nvSpPr>
-            <p:spPr>
-              <a:xfrm>
-                <a:off x="5835380" y="4099990"/>
-                <a:ext cx="2952328" cy="1200329"/>
-              </a:xfrm>
-              <a:prstGeom prst="rect">
-                <a:avLst/>
-              </a:prstGeom>
-              <a:blipFill rotWithShape="1">
-                <a:blip r:embed="rId8"/>
-                <a:stretch>
-                  <a:fillRect t="-4082" b="-11224"/>
-                </a:stretch>
-              </a:blipFill>
-            </p:spPr>
-            <p:txBody>
-              <a:bodyPr/>
-              <a:lstStyle/>
-              <a:p>
-                <a:r>
-                  <a:rPr lang="en-US">
-                    <a:noFill/>
-                  </a:rPr>
-                  <a:t> </a:t>
-                </a:r>
-              </a:p>
-            </p:txBody>
-          </p:sp>
-        </mc:Fallback>
-      </mc:AlternateContent>
     </p:spTree>
     <p:extLst>
       <p:ext uri="{BB962C8B-B14F-4D97-AF65-F5344CB8AC3E}">

</xml_diff>